<commit_message>
Update Event Scheduler & Calendar presentation.pptx
</commit_message>
<xml_diff>
--- a/Event Scheduler & Calendar presentation.pptx
+++ b/Event Scheduler & Calendar presentation.pptx
@@ -25971,6 +25971,15 @@
 </file>
 
 <file path=customXml/item1.xml><?xml version="1.0" encoding="utf-8"?>
+<?mso-contentType ?>
+<FormTemplates xmlns="http://schemas.microsoft.com/sharepoint/v3/contenttype/forms">
+  <Display>DocumentLibraryForm</Display>
+  <Edit>DocumentLibraryForm</Edit>
+  <New>DocumentLibraryForm</New>
+</FormTemplates>
+</file>
+
+<file path=customXml/item2.xml><?xml version="1.0" encoding="utf-8"?>
 <ct:contentTypeSchema xmlns:ct="http://schemas.microsoft.com/office/2006/metadata/contentType" xmlns:ma="http://schemas.microsoft.com/office/2006/metadata/properties/metaAttributes" ct:_="" ma:_="" ma:contentTypeName="Document" ma:contentTypeID="0x01010079F111ED35F8CC479449609E8A0923A6" ma:contentTypeVersion="28" ma:contentTypeDescription="Create a new document." ma:contentTypeScope="" ma:versionID="60f5a4f2d2b0abadcf532d48ebf9cb71">
   <xsd:schema xmlns:xsd="http://www.w3.org/2001/XMLSchema" xmlns:xs="http://www.w3.org/2001/XMLSchema" xmlns:p="http://schemas.microsoft.com/office/2006/metadata/properties" xmlns:ns1="http://schemas.microsoft.com/sharepoint/v3" xmlns:ns2="71af3243-3dd4-4a8d-8c0d-dd76da1f02a5" xmlns:ns3="16c05727-aa75-4e4a-9b5f-8a80a1165891" xmlns:ns4="230e9df3-be65-4c73-a93b-d1236ebd677e" targetNamespace="http://schemas.microsoft.com/office/2006/metadata/properties" ma:root="true" ma:fieldsID="7dd78129e6a1811f84807ad11c651531" ns1:_="" ns2:_="" ns3:_="" ns4:_="">
     <xsd:import namespace="http://schemas.microsoft.com/sharepoint/v3"/>
@@ -26282,7 +26291,7 @@
 </ct:contentTypeSchema>
 </file>
 
-<file path=customXml/item2.xml><?xml version="1.0" encoding="utf-8"?>
+<file path=customXml/item3.xml><?xml version="1.0" encoding="utf-8"?>
 <p:properties xmlns:p="http://schemas.microsoft.com/office/2006/metadata/properties" xmlns:xsi="http://www.w3.org/2001/XMLSchema-instance" xmlns:pc="http://schemas.microsoft.com/office/infopath/2007/PartnerControls">
   <documentManagement>
     <Background xmlns="71af3243-3dd4-4a8d-8c0d-dd76da1f02a5">false</Background>
@@ -26302,16 +26311,15 @@
 </p:properties>
 </file>
 
-<file path=customXml/item3.xml><?xml version="1.0" encoding="utf-8"?>
-<?mso-contentType ?>
-<FormTemplates xmlns="http://schemas.microsoft.com/sharepoint/v3/contenttype/forms">
-  <Display>DocumentLibraryForm</Display>
-  <Edit>DocumentLibraryForm</Edit>
-  <New>DocumentLibraryForm</New>
-</FormTemplates>
+<file path=customXml/itemProps1.xml><?xml version="1.0" encoding="utf-8"?>
+<ds:datastoreItem xmlns:ds="http://schemas.openxmlformats.org/officeDocument/2006/customXml" ds:itemID="{8451406B-581B-4C29-A833-E33D8A6AB075}">
+  <ds:schemaRefs>
+    <ds:schemaRef ds:uri="http://schemas.microsoft.com/sharepoint/v3/contenttype/forms"/>
+  </ds:schemaRefs>
+</ds:datastoreItem>
 </file>
 
-<file path=customXml/itemProps1.xml><?xml version="1.0" encoding="utf-8"?>
+<file path=customXml/itemProps2.xml><?xml version="1.0" encoding="utf-8"?>
 <ds:datastoreItem xmlns:ds="http://schemas.openxmlformats.org/officeDocument/2006/customXml" ds:itemID="{18903D25-5BE2-4D9E-B7D8-BE1DCAE2DC41}">
   <ds:schemaRefs>
     <ds:schemaRef ds:uri="16c05727-aa75-4e4a-9b5f-8a80a1165891"/>
@@ -26332,7 +26340,7 @@
 </ds:datastoreItem>
 </file>
 
-<file path=customXml/itemProps2.xml><?xml version="1.0" encoding="utf-8"?>
+<file path=customXml/itemProps3.xml><?xml version="1.0" encoding="utf-8"?>
 <ds:datastoreItem xmlns:ds="http://schemas.openxmlformats.org/officeDocument/2006/customXml" ds:itemID="{0F65614A-92F9-4391-AC3D-F3F5B0704F99}">
   <ds:schemaRefs>
     <ds:schemaRef ds:uri="230e9df3-be65-4c73-a93b-d1236ebd677e"/>
@@ -26344,10 +26352,6 @@
 </ds:datastoreItem>
 </file>
 
-<file path=customXml/itemProps3.xml><?xml version="1.0" encoding="utf-8"?>
-<ds:datastoreItem xmlns:ds="http://schemas.openxmlformats.org/officeDocument/2006/customXml" ds:itemID="{8451406B-581B-4C29-A833-E33D8A6AB075}">
-  <ds:schemaRefs>
-    <ds:schemaRef ds:uri="http://schemas.microsoft.com/sharepoint/v3/contenttype/forms"/>
-  </ds:schemaRefs>
-</ds:datastoreItem>
+<file path=docMetadata/LabelInfo.xml><?xml version="1.0" encoding="utf-8"?>
+<clbl:labelList xmlns:clbl="http://schemas.microsoft.com/office/2020/mipLabelMetadata"/>
 </file>
</xml_diff>